<commit_message>
add new sponsor on preroll
</commit_message>
<xml_diff>
--- a/preroll_pts2021 - 16x9.pptx
+++ b/preroll_pts2021 - 16x9.pptx
@@ -66,7 +66,7 @@
         <p:spPr>
           <a:xfrm>
             <a:off x="685800" y="1597680"/>
-            <a:ext cx="7771680" cy="1101960"/>
+            <a:ext cx="7771320" cy="1101600"/>
           </a:xfrm>
           <a:prstGeom prst="rect">
             <a:avLst/>
@@ -97,7 +97,7 @@
         <p:spPr>
           <a:xfrm>
             <a:off x="457200" y="1203840"/>
-            <a:ext cx="8229240" cy="1423080"/>
+            <a:ext cx="8228880" cy="1422720"/>
           </a:xfrm>
           <a:prstGeom prst="rect">
             <a:avLst/>
@@ -126,8 +126,8 @@
         </p:nvSpPr>
         <p:spPr>
           <a:xfrm>
-            <a:off x="457200" y="2762640"/>
-            <a:ext cx="8229240" cy="1423080"/>
+            <a:off x="457200" y="2762280"/>
+            <a:ext cx="8228880" cy="1422720"/>
           </a:xfrm>
           <a:prstGeom prst="rect">
             <a:avLst/>
@@ -179,7 +179,7 @@
         <p:spPr>
           <a:xfrm>
             <a:off x="685800" y="1597680"/>
-            <a:ext cx="7771680" cy="1101960"/>
+            <a:ext cx="7771320" cy="1101600"/>
           </a:xfrm>
           <a:prstGeom prst="rect">
             <a:avLst/>
@@ -210,7 +210,7 @@
         <p:spPr>
           <a:xfrm>
             <a:off x="457200" y="1203840"/>
-            <a:ext cx="4015800" cy="1423080"/>
+            <a:ext cx="4015440" cy="1422720"/>
           </a:xfrm>
           <a:prstGeom prst="rect">
             <a:avLst/>
@@ -239,8 +239,8 @@
         </p:nvSpPr>
         <p:spPr>
           <a:xfrm>
-            <a:off x="4674240" y="1203840"/>
-            <a:ext cx="4015800" cy="1423080"/>
+            <a:off x="4673880" y="1203840"/>
+            <a:ext cx="4015440" cy="1422720"/>
           </a:xfrm>
           <a:prstGeom prst="rect">
             <a:avLst/>
@@ -269,8 +269,8 @@
         </p:nvSpPr>
         <p:spPr>
           <a:xfrm>
-            <a:off x="457200" y="2762640"/>
-            <a:ext cx="4015800" cy="1423080"/>
+            <a:off x="457200" y="2762280"/>
+            <a:ext cx="4015440" cy="1422720"/>
           </a:xfrm>
           <a:prstGeom prst="rect">
             <a:avLst/>
@@ -299,8 +299,8 @@
         </p:nvSpPr>
         <p:spPr>
           <a:xfrm>
-            <a:off x="4674240" y="2762640"/>
-            <a:ext cx="4015800" cy="1423080"/>
+            <a:off x="4673880" y="2762280"/>
+            <a:ext cx="4015440" cy="1422720"/>
           </a:xfrm>
           <a:prstGeom prst="rect">
             <a:avLst/>
@@ -352,7 +352,7 @@
         <p:spPr>
           <a:xfrm>
             <a:off x="685800" y="1597680"/>
-            <a:ext cx="7771680" cy="1101960"/>
+            <a:ext cx="7771320" cy="1101600"/>
           </a:xfrm>
           <a:prstGeom prst="rect">
             <a:avLst/>
@@ -383,7 +383,7 @@
         <p:spPr>
           <a:xfrm>
             <a:off x="457200" y="1203840"/>
-            <a:ext cx="2649600" cy="1423080"/>
+            <a:ext cx="2649600" cy="1422720"/>
           </a:xfrm>
           <a:prstGeom prst="rect">
             <a:avLst/>
@@ -413,7 +413,7 @@
         <p:spPr>
           <a:xfrm>
             <a:off x="3239640" y="1203840"/>
-            <a:ext cx="2649600" cy="1423080"/>
+            <a:ext cx="2649600" cy="1422720"/>
           </a:xfrm>
           <a:prstGeom prst="rect">
             <a:avLst/>
@@ -443,7 +443,7 @@
         <p:spPr>
           <a:xfrm>
             <a:off x="6022080" y="1203840"/>
-            <a:ext cx="2649600" cy="1423080"/>
+            <a:ext cx="2649600" cy="1422720"/>
           </a:xfrm>
           <a:prstGeom prst="rect">
             <a:avLst/>
@@ -472,8 +472,8 @@
         </p:nvSpPr>
         <p:spPr>
           <a:xfrm>
-            <a:off x="457200" y="2762640"/>
-            <a:ext cx="2649600" cy="1423080"/>
+            <a:off x="457200" y="2762280"/>
+            <a:ext cx="2649600" cy="1422720"/>
           </a:xfrm>
           <a:prstGeom prst="rect">
             <a:avLst/>
@@ -502,8 +502,8 @@
         </p:nvSpPr>
         <p:spPr>
           <a:xfrm>
-            <a:off x="3239640" y="2762640"/>
-            <a:ext cx="2649600" cy="1423080"/>
+            <a:off x="3239640" y="2762280"/>
+            <a:ext cx="2649600" cy="1422720"/>
           </a:xfrm>
           <a:prstGeom prst="rect">
             <a:avLst/>
@@ -532,8 +532,8 @@
         </p:nvSpPr>
         <p:spPr>
           <a:xfrm>
-            <a:off x="6022080" y="2762640"/>
-            <a:ext cx="2649600" cy="1423080"/>
+            <a:off x="6022080" y="2762280"/>
+            <a:ext cx="2649600" cy="1422720"/>
           </a:xfrm>
           <a:prstGeom prst="rect">
             <a:avLst/>
@@ -585,7 +585,7 @@
         <p:spPr>
           <a:xfrm>
             <a:off x="685800" y="1597680"/>
-            <a:ext cx="7771680" cy="1101960"/>
+            <a:ext cx="7771320" cy="1101600"/>
           </a:xfrm>
           <a:prstGeom prst="rect">
             <a:avLst/>
@@ -616,7 +616,7 @@
         <p:spPr>
           <a:xfrm>
             <a:off x="457200" y="1203840"/>
-            <a:ext cx="8229240" cy="2983680"/>
+            <a:ext cx="8228880" cy="2983320"/>
           </a:xfrm>
           <a:prstGeom prst="rect">
             <a:avLst/>
@@ -669,7 +669,7 @@
         <p:spPr>
           <a:xfrm>
             <a:off x="685800" y="1597680"/>
-            <a:ext cx="7771680" cy="1101960"/>
+            <a:ext cx="7771320" cy="1101600"/>
           </a:xfrm>
           <a:prstGeom prst="rect">
             <a:avLst/>
@@ -700,7 +700,7 @@
         <p:spPr>
           <a:xfrm>
             <a:off x="457200" y="1203840"/>
-            <a:ext cx="8229240" cy="2983680"/>
+            <a:ext cx="8228880" cy="2983320"/>
           </a:xfrm>
           <a:prstGeom prst="rect">
             <a:avLst/>
@@ -752,7 +752,7 @@
         <p:spPr>
           <a:xfrm>
             <a:off x="685800" y="1597680"/>
-            <a:ext cx="7771680" cy="1101960"/>
+            <a:ext cx="7771320" cy="1101600"/>
           </a:xfrm>
           <a:prstGeom prst="rect">
             <a:avLst/>
@@ -783,7 +783,7 @@
         <p:spPr>
           <a:xfrm>
             <a:off x="457200" y="1203840"/>
-            <a:ext cx="4015800" cy="2983680"/>
+            <a:ext cx="4015440" cy="2983320"/>
           </a:xfrm>
           <a:prstGeom prst="rect">
             <a:avLst/>
@@ -812,8 +812,8 @@
         </p:nvSpPr>
         <p:spPr>
           <a:xfrm>
-            <a:off x="4674240" y="1203840"/>
-            <a:ext cx="4015800" cy="2983680"/>
+            <a:off x="4673880" y="1203840"/>
+            <a:ext cx="4015440" cy="2983320"/>
           </a:xfrm>
           <a:prstGeom prst="rect">
             <a:avLst/>
@@ -865,7 +865,7 @@
         <p:spPr>
           <a:xfrm>
             <a:off x="685800" y="1597680"/>
-            <a:ext cx="7771680" cy="1101960"/>
+            <a:ext cx="7771320" cy="1101600"/>
           </a:xfrm>
           <a:prstGeom prst="rect">
             <a:avLst/>
@@ -918,7 +918,7 @@
         <p:spPr>
           <a:xfrm>
             <a:off x="685800" y="1597680"/>
-            <a:ext cx="7771680" cy="5109480"/>
+            <a:ext cx="7771320" cy="5107680"/>
           </a:xfrm>
           <a:prstGeom prst="rect">
             <a:avLst/>
@@ -971,7 +971,7 @@
         <p:spPr>
           <a:xfrm>
             <a:off x="685800" y="1597680"/>
-            <a:ext cx="7771680" cy="1101960"/>
+            <a:ext cx="7771320" cy="1101600"/>
           </a:xfrm>
           <a:prstGeom prst="rect">
             <a:avLst/>
@@ -1002,7 +1002,7 @@
         <p:spPr>
           <a:xfrm>
             <a:off x="457200" y="1203840"/>
-            <a:ext cx="4015800" cy="1423080"/>
+            <a:ext cx="4015440" cy="1422720"/>
           </a:xfrm>
           <a:prstGeom prst="rect">
             <a:avLst/>
@@ -1031,8 +1031,8 @@
         </p:nvSpPr>
         <p:spPr>
           <a:xfrm>
-            <a:off x="4674240" y="1203840"/>
-            <a:ext cx="4015800" cy="2983680"/>
+            <a:off x="4673880" y="1203840"/>
+            <a:ext cx="4015440" cy="2983320"/>
           </a:xfrm>
           <a:prstGeom prst="rect">
             <a:avLst/>
@@ -1061,8 +1061,8 @@
         </p:nvSpPr>
         <p:spPr>
           <a:xfrm>
-            <a:off x="457200" y="2762640"/>
-            <a:ext cx="4015800" cy="1423080"/>
+            <a:off x="457200" y="2762280"/>
+            <a:ext cx="4015440" cy="1422720"/>
           </a:xfrm>
           <a:prstGeom prst="rect">
             <a:avLst/>
@@ -1114,7 +1114,7 @@
         <p:spPr>
           <a:xfrm>
             <a:off x="685800" y="1597680"/>
-            <a:ext cx="7771680" cy="1101960"/>
+            <a:ext cx="7771320" cy="1101600"/>
           </a:xfrm>
           <a:prstGeom prst="rect">
             <a:avLst/>
@@ -1145,7 +1145,7 @@
         <p:spPr>
           <a:xfrm>
             <a:off x="457200" y="1203840"/>
-            <a:ext cx="4015800" cy="2983680"/>
+            <a:ext cx="4015440" cy="2983320"/>
           </a:xfrm>
           <a:prstGeom prst="rect">
             <a:avLst/>
@@ -1174,8 +1174,8 @@
         </p:nvSpPr>
         <p:spPr>
           <a:xfrm>
-            <a:off x="4674240" y="1203840"/>
-            <a:ext cx="4015800" cy="1423080"/>
+            <a:off x="4673880" y="1203840"/>
+            <a:ext cx="4015440" cy="1422720"/>
           </a:xfrm>
           <a:prstGeom prst="rect">
             <a:avLst/>
@@ -1204,8 +1204,8 @@
         </p:nvSpPr>
         <p:spPr>
           <a:xfrm>
-            <a:off x="4674240" y="2762640"/>
-            <a:ext cx="4015800" cy="1423080"/>
+            <a:off x="4673880" y="2762280"/>
+            <a:ext cx="4015440" cy="1422720"/>
           </a:xfrm>
           <a:prstGeom prst="rect">
             <a:avLst/>
@@ -1257,7 +1257,7 @@
         <p:spPr>
           <a:xfrm>
             <a:off x="685800" y="1597680"/>
-            <a:ext cx="7771680" cy="1101960"/>
+            <a:ext cx="7771320" cy="1101600"/>
           </a:xfrm>
           <a:prstGeom prst="rect">
             <a:avLst/>
@@ -1288,7 +1288,7 @@
         <p:spPr>
           <a:xfrm>
             <a:off x="457200" y="1203840"/>
-            <a:ext cx="4015800" cy="1423080"/>
+            <a:ext cx="4015440" cy="1422720"/>
           </a:xfrm>
           <a:prstGeom prst="rect">
             <a:avLst/>
@@ -1317,8 +1317,8 @@
         </p:nvSpPr>
         <p:spPr>
           <a:xfrm>
-            <a:off x="4674240" y="1203840"/>
-            <a:ext cx="4015800" cy="1423080"/>
+            <a:off x="4673880" y="1203840"/>
+            <a:ext cx="4015440" cy="1422720"/>
           </a:xfrm>
           <a:prstGeom prst="rect">
             <a:avLst/>
@@ -1347,8 +1347,8 @@
         </p:nvSpPr>
         <p:spPr>
           <a:xfrm>
-            <a:off x="457200" y="2762640"/>
-            <a:ext cx="8229240" cy="1423080"/>
+            <a:off x="457200" y="2762280"/>
+            <a:ext cx="8228880" cy="1422720"/>
           </a:xfrm>
           <a:prstGeom prst="rect">
             <a:avLst/>
@@ -1408,7 +1408,7 @@
         <p:spPr>
           <a:xfrm>
             <a:off x="685800" y="1597680"/>
-            <a:ext cx="7771680" cy="1101960"/>
+            <a:ext cx="7771320" cy="1101600"/>
           </a:xfrm>
           <a:prstGeom prst="rect">
             <a:avLst/>
@@ -1423,79 +1423,7 @@
               <a:rPr b="0" lang="fr-BE" sz="1800" spc="-1" strike="noStrike">
                 <a:latin typeface="Arial"/>
               </a:rPr>
-              <a:t>Cliq</a:t>
-            </a:r>
-            <a:r>
-              <a:rPr b="0" lang="fr-BE" sz="1800" spc="-1" strike="noStrike">
-                <a:latin typeface="Arial"/>
-              </a:rPr>
-              <a:t>uez </a:t>
-            </a:r>
-            <a:r>
-              <a:rPr b="0" lang="fr-BE" sz="1800" spc="-1" strike="noStrike">
-                <a:latin typeface="Arial"/>
-              </a:rPr>
-              <a:t>pou</a:t>
-            </a:r>
-            <a:r>
-              <a:rPr b="0" lang="fr-BE" sz="1800" spc="-1" strike="noStrike">
-                <a:latin typeface="Arial"/>
-              </a:rPr>
-              <a:t>r </a:t>
-            </a:r>
-            <a:r>
-              <a:rPr b="0" lang="fr-BE" sz="1800" spc="-1" strike="noStrike">
-                <a:latin typeface="Arial"/>
-              </a:rPr>
-              <a:t>édit</a:t>
-            </a:r>
-            <a:r>
-              <a:rPr b="0" lang="fr-BE" sz="1800" spc="-1" strike="noStrike">
-                <a:latin typeface="Arial"/>
-              </a:rPr>
-              <a:t>er </a:t>
-            </a:r>
-            <a:r>
-              <a:rPr b="0" lang="fr-BE" sz="1800" spc="-1" strike="noStrike">
-                <a:latin typeface="Arial"/>
-              </a:rPr>
-              <a:t>le </a:t>
-            </a:r>
-            <a:r>
-              <a:rPr b="0" lang="fr-BE" sz="1800" spc="-1" strike="noStrike">
-                <a:latin typeface="Arial"/>
-              </a:rPr>
-              <a:t>for</a:t>
-            </a:r>
-            <a:r>
-              <a:rPr b="0" lang="fr-BE" sz="1800" spc="-1" strike="noStrike">
-                <a:latin typeface="Arial"/>
-              </a:rPr>
-              <a:t>mat </a:t>
-            </a:r>
-            <a:r>
-              <a:rPr b="0" lang="fr-BE" sz="1800" spc="-1" strike="noStrike">
-                <a:latin typeface="Arial"/>
-              </a:rPr>
-              <a:t>du </a:t>
-            </a:r>
-            <a:r>
-              <a:rPr b="0" lang="fr-BE" sz="1800" spc="-1" strike="noStrike">
-                <a:latin typeface="Arial"/>
-              </a:rPr>
-              <a:t>text</a:t>
-            </a:r>
-            <a:r>
-              <a:rPr b="0" lang="fr-BE" sz="1800" spc="-1" strike="noStrike">
-                <a:latin typeface="Arial"/>
-              </a:rPr>
-              <a:t>e-</a:t>
-            </a:r>
-            <a:r>
-              <a:rPr b="0" lang="fr-BE" sz="1800" spc="-1" strike="noStrike">
-                <a:latin typeface="Arial"/>
-              </a:rPr>
-              <a:t>titre</a:t>
+              <a:t>Cliquez pour éditer le format du texte-titre</a:t>
             </a:r>
             <a:endParaRPr b="0" lang="fr-BE" sz="1800" spc="-1" strike="noStrike">
               <a:latin typeface="Arial"/>
@@ -1516,7 +1444,7 @@
         <p:spPr>
           <a:xfrm>
             <a:off x="457200" y="1203840"/>
-            <a:ext cx="8229240" cy="2983680"/>
+            <a:ext cx="8228880" cy="2983320"/>
           </a:xfrm>
           <a:prstGeom prst="rect">
             <a:avLst/>
@@ -1524,7 +1452,7 @@
         </p:spPr>
         <p:txBody>
           <a:bodyPr lIns="0" rIns="0" tIns="0" bIns="0">
-            <a:normAutofit fontScale="80000"/>
+            <a:normAutofit/>
           </a:bodyPr>
           <a:p>
             <a:pPr marL="432000" indent="-324000">
@@ -1539,12 +1467,12 @@
               <a:buChar char=""/>
             </a:pPr>
             <a:r>
-              <a:rPr b="0" lang="fr-BE" sz="3200" spc="-1" strike="noStrike">
+              <a:rPr b="0" lang="fr-BE" sz="1800" spc="-1" strike="noStrike">
                 <a:latin typeface="Arial"/>
               </a:rPr>
               <a:t>Cliquez pour éditer le format du plan de texte</a:t>
             </a:r>
-            <a:endParaRPr b="0" lang="fr-BE" sz="3200" spc="-1" strike="noStrike">
+            <a:endParaRPr b="0" lang="fr-BE" sz="1800" spc="-1" strike="noStrike">
               <a:latin typeface="Arial"/>
             </a:endParaRPr>
           </a:p>
@@ -1561,12 +1489,12 @@
               <a:buChar char=""/>
             </a:pPr>
             <a:r>
-              <a:rPr b="0" lang="fr-BE" sz="2800" spc="-1" strike="noStrike">
+              <a:rPr b="0" lang="fr-BE" sz="1800" spc="-1" strike="noStrike">
                 <a:latin typeface="Arial"/>
               </a:rPr>
               <a:t>Second niveau de plan</a:t>
             </a:r>
-            <a:endParaRPr b="0" lang="fr-BE" sz="2800" spc="-1" strike="noStrike">
+            <a:endParaRPr b="0" lang="fr-BE" sz="1800" spc="-1" strike="noStrike">
               <a:latin typeface="Arial"/>
             </a:endParaRPr>
           </a:p>
@@ -1583,12 +1511,12 @@
               <a:buChar char=""/>
             </a:pPr>
             <a:r>
-              <a:rPr b="0" lang="fr-BE" sz="2400" spc="-1" strike="noStrike">
+              <a:rPr b="0" lang="fr-BE" sz="1800" spc="-1" strike="noStrike">
                 <a:latin typeface="Arial"/>
               </a:rPr>
               <a:t>Troisième niveau de plan</a:t>
             </a:r>
-            <a:endParaRPr b="0" lang="fr-BE" sz="2400" spc="-1" strike="noStrike">
+            <a:endParaRPr b="0" lang="fr-BE" sz="1800" spc="-1" strike="noStrike">
               <a:latin typeface="Arial"/>
             </a:endParaRPr>
           </a:p>
@@ -1605,12 +1533,12 @@
               <a:buChar char=""/>
             </a:pPr>
             <a:r>
-              <a:rPr b="0" lang="fr-BE" sz="2000" spc="-1" strike="noStrike">
+              <a:rPr b="0" lang="fr-BE" sz="1800" spc="-1" strike="noStrike">
                 <a:latin typeface="Arial"/>
               </a:rPr>
               <a:t>Quatrième niveau de plan</a:t>
             </a:r>
-            <a:endParaRPr b="0" lang="fr-BE" sz="2000" spc="-1" strike="noStrike">
+            <a:endParaRPr b="0" lang="fr-BE" sz="1800" spc="-1" strike="noStrike">
               <a:latin typeface="Arial"/>
             </a:endParaRPr>
           </a:p>
@@ -1627,12 +1555,12 @@
               <a:buChar char=""/>
             </a:pPr>
             <a:r>
-              <a:rPr b="0" lang="fr-BE" sz="2000" spc="-1" strike="noStrike">
+              <a:rPr b="0" lang="fr-BE" sz="1800" spc="-1" strike="noStrike">
                 <a:latin typeface="Arial"/>
               </a:rPr>
               <a:t>Cinquième niveau de plan</a:t>
             </a:r>
-            <a:endParaRPr b="0" lang="fr-BE" sz="2000" spc="-1" strike="noStrike">
+            <a:endParaRPr b="0" lang="fr-BE" sz="1800" spc="-1" strike="noStrike">
               <a:latin typeface="Arial"/>
             </a:endParaRPr>
           </a:p>
@@ -1649,12 +1577,12 @@
               <a:buChar char=""/>
             </a:pPr>
             <a:r>
-              <a:rPr b="0" lang="fr-BE" sz="2000" spc="-1" strike="noStrike">
+              <a:rPr b="0" lang="fr-BE" sz="1800" spc="-1" strike="noStrike">
                 <a:latin typeface="Arial"/>
               </a:rPr>
               <a:t>Sixième niveau de plan</a:t>
             </a:r>
-            <a:endParaRPr b="0" lang="fr-BE" sz="2000" spc="-1" strike="noStrike">
+            <a:endParaRPr b="0" lang="fr-BE" sz="1800" spc="-1" strike="noStrike">
               <a:latin typeface="Arial"/>
             </a:endParaRPr>
           </a:p>
@@ -1671,12 +1599,12 @@
               <a:buChar char=""/>
             </a:pPr>
             <a:r>
-              <a:rPr b="0" lang="fr-BE" sz="2000" spc="-1" strike="noStrike">
+              <a:rPr b="0" lang="fr-BE" sz="1800" spc="-1" strike="noStrike">
                 <a:latin typeface="Arial"/>
               </a:rPr>
               <a:t>Septième niveau de plan</a:t>
             </a:r>
-            <a:endParaRPr b="0" lang="fr-BE" sz="2000" spc="-1" strike="noStrike">
+            <a:endParaRPr b="0" lang="fr-BE" sz="1800" spc="-1" strike="noStrike">
               <a:latin typeface="Arial"/>
             </a:endParaRPr>
           </a:p>
@@ -1728,7 +1656,7 @@
         <p:spPr>
           <a:xfrm>
             <a:off x="0" y="4035960"/>
-            <a:ext cx="9143280" cy="1095480"/>
+            <a:ext cx="9142920" cy="1095120"/>
           </a:xfrm>
           <a:prstGeom prst="rect">
             <a:avLst/>
@@ -1783,7 +1711,7 @@
         <p:spPr>
           <a:xfrm>
             <a:off x="3406320" y="195480"/>
-            <a:ext cx="2330640" cy="3609360"/>
+            <a:ext cx="2330280" cy="3609000"/>
           </a:xfrm>
           <a:prstGeom prst="rect">
             <a:avLst/>
@@ -1831,8 +1759,8 @@
         </p:nvSpPr>
         <p:spPr>
           <a:xfrm flipH="1">
-            <a:off x="-1440" y="938520"/>
-            <a:ext cx="9143280" cy="4205160"/>
+            <a:off x="-2160" y="938520"/>
+            <a:ext cx="9142920" cy="4204800"/>
           </a:xfrm>
           <a:prstGeom prst="rect">
             <a:avLst/>
@@ -1944,7 +1872,7 @@
         <p:spPr>
           <a:xfrm>
             <a:off x="13320" y="-132840"/>
-            <a:ext cx="9116280" cy="1095840"/>
+            <a:ext cx="9115920" cy="1095480"/>
           </a:xfrm>
           <a:prstGeom prst="rect">
             <a:avLst/>
@@ -1995,7 +1923,7 @@
         <p:spPr>
           <a:xfrm>
             <a:off x="1800" y="938520"/>
-            <a:ext cx="581040" cy="1006920"/>
+            <a:ext cx="580680" cy="1006560"/>
           </a:xfrm>
           <a:prstGeom prst="rect">
             <a:avLst/>
@@ -2014,7 +1942,7 @@
           <a:fontRef idx="minor"/>
         </p:style>
         <p:txBody>
-          <a:bodyPr lIns="45000" rIns="45000" tIns="90000" bIns="90000" anchor="ctr" anchorCtr="1" vert="vert270" rot="16200000">
+          <a:bodyPr lIns="90000" rIns="90000" tIns="45000" bIns="45000" anchor="ctr" anchorCtr="1" vert="vert270" rot="16200000">
             <a:noAutofit/>
           </a:bodyPr>
           <a:p>
@@ -2024,7 +1952,7 @@
               </a:lnSpc>
             </a:pPr>
             <a:r>
-              <a:rPr b="0" lang="fr-FR" sz="1800" spc="-1" strike="noStrike">
+              <a:rPr b="0" lang="fr-FR" sz="1600" spc="-1" strike="noStrike">
                 <a:solidFill>
                   <a:srgbClr val="ffffff"/>
                 </a:solidFill>
@@ -2033,7 +1961,7 @@
               </a:rPr>
               <a:t>Platinum</a:t>
             </a:r>
-            <a:endParaRPr b="0" lang="fr-BE" sz="1800" spc="-1" strike="noStrike">
+            <a:endParaRPr b="0" lang="fr-BE" sz="1600" spc="-1" strike="noStrike">
               <a:latin typeface="Arial"/>
             </a:endParaRPr>
           </a:p>
@@ -2048,7 +1976,7 @@
         <p:spPr>
           <a:xfrm>
             <a:off x="1800" y="1946160"/>
-            <a:ext cx="581040" cy="1524960"/>
+            <a:ext cx="580680" cy="1524600"/>
           </a:xfrm>
           <a:prstGeom prst="rect">
             <a:avLst/>
@@ -2067,7 +1995,7 @@
           <a:fontRef idx="minor"/>
         </p:style>
         <p:txBody>
-          <a:bodyPr lIns="45000" rIns="45000" tIns="90000" bIns="90000" anchor="ctr" anchorCtr="1" vert="vert270" rot="16200000">
+          <a:bodyPr lIns="90000" rIns="90000" tIns="45000" bIns="45000" anchor="ctr" anchorCtr="1" vert="vert270" rot="16200000">
             <a:noAutofit/>
           </a:bodyPr>
           <a:p>
@@ -2101,7 +2029,7 @@
         <p:spPr>
           <a:xfrm>
             <a:off x="1800" y="3471840"/>
-            <a:ext cx="581040" cy="756000"/>
+            <a:ext cx="580680" cy="755640"/>
           </a:xfrm>
           <a:prstGeom prst="rect">
             <a:avLst/>
@@ -2120,7 +2048,7 @@
           <a:fontRef idx="minor"/>
         </p:style>
         <p:txBody>
-          <a:bodyPr lIns="45000" rIns="45000" tIns="90000" bIns="90000" anchor="ctr" anchorCtr="1" vert="vert270" rot="16200000">
+          <a:bodyPr lIns="90000" rIns="90000" tIns="45000" bIns="45000" anchor="ctr" anchorCtr="1" vert="vert270" rot="16200000">
             <a:noAutofit/>
           </a:bodyPr>
           <a:p>
@@ -2154,7 +2082,7 @@
         <p:spPr>
           <a:xfrm>
             <a:off x="1800" y="4228200"/>
-            <a:ext cx="581040" cy="914760"/>
+            <a:ext cx="580680" cy="914400"/>
           </a:xfrm>
           <a:prstGeom prst="rect">
             <a:avLst/>
@@ -2173,7 +2101,7 @@
           <a:fontRef idx="minor"/>
         </p:style>
         <p:txBody>
-          <a:bodyPr lIns="45000" rIns="45000" tIns="90000" bIns="90000" anchor="ctr" anchorCtr="1" vert="vert270" rot="16200000">
+          <a:bodyPr lIns="90000" rIns="90000" tIns="45000" bIns="45000" anchor="ctr" anchorCtr="1" vert="vert270" rot="16200000">
             <a:noAutofit/>
           </a:bodyPr>
           <a:p>
@@ -2211,7 +2139,7 @@
         <p:spPr>
           <a:xfrm>
             <a:off x="4752000" y="2160000"/>
-            <a:ext cx="1829520" cy="469440"/>
+            <a:ext cx="1829160" cy="469080"/>
           </a:xfrm>
           <a:prstGeom prst="rect">
             <a:avLst/>
@@ -2234,7 +2162,7 @@
         <p:spPr>
           <a:xfrm>
             <a:off x="1393560" y="2068920"/>
-            <a:ext cx="1460520" cy="477000"/>
+            <a:ext cx="1460160" cy="476640"/>
           </a:xfrm>
           <a:prstGeom prst="rect">
             <a:avLst/>
@@ -2257,7 +2185,7 @@
         <p:spPr>
           <a:xfrm>
             <a:off x="3778200" y="4485240"/>
-            <a:ext cx="1338120" cy="366120"/>
+            <a:ext cx="1337760" cy="365760"/>
           </a:xfrm>
           <a:prstGeom prst="rect">
             <a:avLst/>
@@ -2280,7 +2208,7 @@
         <p:spPr>
           <a:xfrm>
             <a:off x="6173640" y="2808000"/>
-            <a:ext cx="1926000" cy="477000"/>
+            <a:ext cx="1925640" cy="476640"/>
           </a:xfrm>
           <a:prstGeom prst="rect">
             <a:avLst/>
@@ -2303,7 +2231,7 @@
         <p:spPr>
           <a:xfrm>
             <a:off x="3571920" y="3724200"/>
-            <a:ext cx="1751040" cy="343800"/>
+            <a:ext cx="1750680" cy="343440"/>
           </a:xfrm>
           <a:prstGeom prst="rect">
             <a:avLst/>
@@ -2325,8 +2253,8 @@
         </p:blipFill>
         <p:spPr>
           <a:xfrm>
-            <a:off x="2880000" y="1069560"/>
-            <a:ext cx="3117240" cy="802080"/>
+            <a:off x="1080000" y="1069560"/>
+            <a:ext cx="3116880" cy="801720"/>
           </a:xfrm>
           <a:prstGeom prst="rect">
             <a:avLst/>
@@ -2349,7 +2277,7 @@
         <p:spPr>
           <a:xfrm>
             <a:off x="3189600" y="2542680"/>
-            <a:ext cx="914040" cy="914040"/>
+            <a:ext cx="913680" cy="913680"/>
           </a:xfrm>
           <a:prstGeom prst="rect">
             <a:avLst/>
@@ -2372,7 +2300,7 @@
         <p:spPr>
           <a:xfrm>
             <a:off x="1379520" y="4392000"/>
-            <a:ext cx="1428120" cy="613800"/>
+            <a:ext cx="1427760" cy="613440"/>
           </a:xfrm>
           <a:prstGeom prst="rect">
             <a:avLst/>
@@ -2395,7 +2323,30 @@
         <p:spPr>
           <a:xfrm>
             <a:off x="6048000" y="4246200"/>
-            <a:ext cx="2015640" cy="864720"/>
+            <a:ext cx="2015280" cy="864360"/>
+          </a:xfrm>
+          <a:prstGeom prst="rect">
+            <a:avLst/>
+          </a:prstGeom>
+          <a:ln w="0">
+            <a:noFill/>
+          </a:ln>
+        </p:spPr>
+      </p:pic>
+      <p:pic>
+        <p:nvPicPr>
+          <p:cNvPr id="58" name="" descr=""/>
+          <p:cNvPicPr/>
+          <p:nvPr/>
+        </p:nvPicPr>
+        <p:blipFill>
+          <a:blip r:embed="rId10"/>
+          <a:stretch/>
+        </p:blipFill>
+        <p:spPr>
+          <a:xfrm>
+            <a:off x="4824000" y="1152000"/>
+            <a:ext cx="3960000" cy="681840"/>
           </a:xfrm>
           <a:prstGeom prst="rect">
             <a:avLst/>
@@ -2437,14 +2388,14 @@
       </p:grpSpPr>
       <p:sp>
         <p:nvSpPr>
-          <p:cNvPr id="58" name="CustomShape 1"/>
+          <p:cNvPr id="59" name="CustomShape 1"/>
           <p:cNvSpPr/>
           <p:nvPr/>
         </p:nvSpPr>
         <p:spPr>
           <a:xfrm>
             <a:off x="0" y="1869120"/>
-            <a:ext cx="9143280" cy="1095480"/>
+            <a:ext cx="9142920" cy="1095120"/>
           </a:xfrm>
           <a:prstGeom prst="rect">
             <a:avLst/>

</xml_diff>